<commit_message>
adding voice to the powerpoint
</commit_message>
<xml_diff>
--- a/Documents/Group 2 Presentation_ development.pptx
+++ b/Documents/Group 2 Presentation_ development.pptx
@@ -106,6 +106,11 @@
       </a:defRPr>
     </a:lvl9pPr>
   </p:defaultTextStyle>
+  <p:extLst>
+    <p:ext uri="{EFAFB233-063F-42B5-8137-9DF3F51BA10A}">
+      <p15:sldGuideLst xmlns:p15="http://schemas.microsoft.com/office/powerpoint/2012/main"/>
+    </p:ext>
+  </p:extLst>
 </p:presentation>
 </file>
 
@@ -154,7 +159,6 @@
               <a:rPr lang="en-US"/>
               <a:t>Click to edit Master title style</a:t>
             </a:r>
-            <a:endParaRPr lang="en-US"/>
           </a:p>
         </p:txBody>
       </p:sp>
@@ -219,7 +223,6 @@
               <a:rPr lang="en-US"/>
               <a:t>Click to edit Master subtitle style</a:t>
             </a:r>
-            <a:endParaRPr lang="en-US"/>
           </a:p>
         </p:txBody>
       </p:sp>
@@ -240,7 +243,7 @@
           <a:p>
             <a:fld id="{907C6E65-9F73-43CA-A1AE-8AFAC9E3FB29}" type="datetimeFigureOut">
               <a:rPr lang="en-US" smtClean="0"/>
-              <a:t>11/25/2016</a:t>
+              <a:t>11/27/2016</a:t>
             </a:fld>
             <a:endParaRPr lang="en-US"/>
           </a:p>
@@ -337,7 +340,6 @@
               <a:rPr lang="en-US"/>
               <a:t>Click to edit Master title style</a:t>
             </a:r>
-            <a:endParaRPr lang="en-US"/>
           </a:p>
         </p:txBody>
       </p:sp>
@@ -389,7 +391,6 @@
               <a:rPr lang="en-US"/>
               <a:t>Fifth level</a:t>
             </a:r>
-            <a:endParaRPr lang="en-US"/>
           </a:p>
         </p:txBody>
       </p:sp>
@@ -410,7 +411,7 @@
           <a:p>
             <a:fld id="{907C6E65-9F73-43CA-A1AE-8AFAC9E3FB29}" type="datetimeFigureOut">
               <a:rPr lang="en-US" smtClean="0"/>
-              <a:t>11/25/2016</a:t>
+              <a:t>11/27/2016</a:t>
             </a:fld>
             <a:endParaRPr lang="en-US"/>
           </a:p>
@@ -512,7 +513,6 @@
               <a:rPr lang="en-US"/>
               <a:t>Click to edit Master title style</a:t>
             </a:r>
-            <a:endParaRPr lang="en-US"/>
           </a:p>
         </p:txBody>
       </p:sp>
@@ -569,7 +569,6 @@
               <a:rPr lang="en-US"/>
               <a:t>Fifth level</a:t>
             </a:r>
-            <a:endParaRPr lang="en-US"/>
           </a:p>
         </p:txBody>
       </p:sp>
@@ -590,7 +589,7 @@
           <a:p>
             <a:fld id="{907C6E65-9F73-43CA-A1AE-8AFAC9E3FB29}" type="datetimeFigureOut">
               <a:rPr lang="en-US" smtClean="0"/>
-              <a:t>11/25/2016</a:t>
+              <a:t>11/27/2016</a:t>
             </a:fld>
             <a:endParaRPr lang="en-US"/>
           </a:p>
@@ -687,7 +686,6 @@
               <a:rPr lang="en-US"/>
               <a:t>Click to edit Master title style</a:t>
             </a:r>
-            <a:endParaRPr lang="en-US"/>
           </a:p>
         </p:txBody>
       </p:sp>
@@ -739,7 +737,6 @@
               <a:rPr lang="en-US"/>
               <a:t>Fifth level</a:t>
             </a:r>
-            <a:endParaRPr lang="en-US"/>
           </a:p>
         </p:txBody>
       </p:sp>
@@ -760,7 +757,7 @@
           <a:p>
             <a:fld id="{907C6E65-9F73-43CA-A1AE-8AFAC9E3FB29}" type="datetimeFigureOut">
               <a:rPr lang="en-US" smtClean="0"/>
-              <a:t>11/25/2016</a:t>
+              <a:t>11/27/2016</a:t>
             </a:fld>
             <a:endParaRPr lang="en-US"/>
           </a:p>
@@ -866,7 +863,6 @@
               <a:rPr lang="en-US"/>
               <a:t>Click to edit Master title style</a:t>
             </a:r>
-            <a:endParaRPr lang="en-US"/>
           </a:p>
         </p:txBody>
       </p:sp>
@@ -1006,7 +1002,7 @@
           <a:p>
             <a:fld id="{907C6E65-9F73-43CA-A1AE-8AFAC9E3FB29}" type="datetimeFigureOut">
               <a:rPr lang="en-US" smtClean="0"/>
-              <a:t>11/25/2016</a:t>
+              <a:t>11/27/2016</a:t>
             </a:fld>
             <a:endParaRPr lang="en-US"/>
           </a:p>
@@ -1103,7 +1099,6 @@
               <a:rPr lang="en-US"/>
               <a:t>Click to edit Master title style</a:t>
             </a:r>
-            <a:endParaRPr lang="en-US"/>
           </a:p>
         </p:txBody>
       </p:sp>
@@ -1160,7 +1155,6 @@
               <a:rPr lang="en-US"/>
               <a:t>Fifth level</a:t>
             </a:r>
-            <a:endParaRPr lang="en-US"/>
           </a:p>
         </p:txBody>
       </p:sp>
@@ -1217,7 +1211,6 @@
               <a:rPr lang="en-US"/>
               <a:t>Fifth level</a:t>
             </a:r>
-            <a:endParaRPr lang="en-US"/>
           </a:p>
         </p:txBody>
       </p:sp>
@@ -1238,7 +1231,7 @@
           <a:p>
             <a:fld id="{907C6E65-9F73-43CA-A1AE-8AFAC9E3FB29}" type="datetimeFigureOut">
               <a:rPr lang="en-US" smtClean="0"/>
-              <a:t>11/25/2016</a:t>
+              <a:t>11/27/2016</a:t>
             </a:fld>
             <a:endParaRPr lang="en-US"/>
           </a:p>
@@ -1340,7 +1333,6 @@
               <a:rPr lang="en-US"/>
               <a:t>Click to edit Master title style</a:t>
             </a:r>
-            <a:endParaRPr lang="en-US"/>
           </a:p>
         </p:txBody>
       </p:sp>
@@ -1462,7 +1454,6 @@
               <a:rPr lang="en-US"/>
               <a:t>Fifth level</a:t>
             </a:r>
-            <a:endParaRPr lang="en-US"/>
           </a:p>
         </p:txBody>
       </p:sp>
@@ -1584,7 +1575,6 @@
               <a:rPr lang="en-US"/>
               <a:t>Fifth level</a:t>
             </a:r>
-            <a:endParaRPr lang="en-US"/>
           </a:p>
         </p:txBody>
       </p:sp>
@@ -1605,7 +1595,7 @@
           <a:p>
             <a:fld id="{907C6E65-9F73-43CA-A1AE-8AFAC9E3FB29}" type="datetimeFigureOut">
               <a:rPr lang="en-US" smtClean="0"/>
-              <a:t>11/25/2016</a:t>
+              <a:t>11/27/2016</a:t>
             </a:fld>
             <a:endParaRPr lang="en-US"/>
           </a:p>
@@ -1702,7 +1692,6 @@
               <a:rPr lang="en-US"/>
               <a:t>Click to edit Master title style</a:t>
             </a:r>
-            <a:endParaRPr lang="en-US"/>
           </a:p>
         </p:txBody>
       </p:sp>
@@ -1723,7 +1712,7 @@
           <a:p>
             <a:fld id="{907C6E65-9F73-43CA-A1AE-8AFAC9E3FB29}" type="datetimeFigureOut">
               <a:rPr lang="en-US" smtClean="0"/>
-              <a:t>11/25/2016</a:t>
+              <a:t>11/27/2016</a:t>
             </a:fld>
             <a:endParaRPr lang="en-US"/>
           </a:p>
@@ -1818,7 +1807,7 @@
           <a:p>
             <a:fld id="{907C6E65-9F73-43CA-A1AE-8AFAC9E3FB29}" type="datetimeFigureOut">
               <a:rPr lang="en-US" smtClean="0"/>
-              <a:t>11/25/2016</a:t>
+              <a:t>11/27/2016</a:t>
             </a:fld>
             <a:endParaRPr lang="en-US"/>
           </a:p>
@@ -1924,7 +1913,6 @@
               <a:rPr lang="en-US"/>
               <a:t>Click to edit Master title style</a:t>
             </a:r>
-            <a:endParaRPr lang="en-US"/>
           </a:p>
         </p:txBody>
       </p:sp>
@@ -2009,7 +1997,6 @@
               <a:rPr lang="en-US"/>
               <a:t>Fifth level</a:t>
             </a:r>
-            <a:endParaRPr lang="en-US"/>
           </a:p>
         </p:txBody>
       </p:sp>
@@ -2095,7 +2082,7 @@
           <a:p>
             <a:fld id="{907C6E65-9F73-43CA-A1AE-8AFAC9E3FB29}" type="datetimeFigureOut">
               <a:rPr lang="en-US" smtClean="0"/>
-              <a:t>11/25/2016</a:t>
+              <a:t>11/27/2016</a:t>
             </a:fld>
             <a:endParaRPr lang="en-US"/>
           </a:p>
@@ -2201,7 +2188,6 @@
               <a:rPr lang="en-US"/>
               <a:t>Click to edit Master title style</a:t>
             </a:r>
-            <a:endParaRPr lang="en-US"/>
           </a:p>
         </p:txBody>
       </p:sp>
@@ -2348,7 +2334,7 @@
           <a:p>
             <a:fld id="{907C6E65-9F73-43CA-A1AE-8AFAC9E3FB29}" type="datetimeFigureOut">
               <a:rPr lang="en-US" smtClean="0"/>
-              <a:t>11/25/2016</a:t>
+              <a:t>11/27/2016</a:t>
             </a:fld>
             <a:endParaRPr lang="en-US"/>
           </a:p>
@@ -2460,7 +2446,6 @@
               <a:rPr lang="en-US"/>
               <a:t>Click to edit Master title style</a:t>
             </a:r>
-            <a:endParaRPr lang="en-US"/>
           </a:p>
         </p:txBody>
       </p:sp>
@@ -2522,7 +2507,6 @@
               <a:rPr lang="en-US"/>
               <a:t>Fifth level</a:t>
             </a:r>
-            <a:endParaRPr lang="en-US"/>
           </a:p>
         </p:txBody>
       </p:sp>
@@ -2561,7 +2545,7 @@
           <a:p>
             <a:fld id="{907C6E65-9F73-43CA-A1AE-8AFAC9E3FB29}" type="datetimeFigureOut">
               <a:rPr lang="en-US" smtClean="0"/>
-              <a:t>11/25/2016</a:t>
+              <a:t>11/27/2016</a:t>
             </a:fld>
             <a:endParaRPr lang="en-US"/>
           </a:p>
@@ -3020,12 +3004,34 @@
               <a:rPr lang="en-US" dirty="0"/>
               <a:t> Hub </a:t>
             </a:r>
+            <a:endParaRPr lang="en-US" dirty="0"/>
           </a:p>
           <a:p>
             <a:r>
               <a:rPr lang="en-US" dirty="0"/>
-              <a:t>Language: C#</a:t>
-            </a:r>
+              <a:t>IDE: Visual Studio</a:t>
+            </a:r>
+            <a:endParaRPr lang="en-US" dirty="0"/>
+          </a:p>
+          <a:p>
+            <a:r>
+              <a:rPr lang="en-US" dirty="0"/>
+              <a:t>Language: C#6</a:t>
+            </a:r>
+            <a:endParaRPr lang="en-US" dirty="0"/>
+          </a:p>
+          <a:p>
+            <a:r>
+              <a:rPr lang="en-US" dirty="0"/>
+              <a:t>Target platform: Windows 7+</a:t>
+            </a:r>
+          </a:p>
+          <a:p>
+            <a:r>
+              <a:rPr lang="en-US" dirty="0"/>
+              <a:t>GUI WPF</a:t>
+            </a:r>
+            <a:endParaRPr lang="en-US" dirty="0"/>
           </a:p>
           <a:p>
             <a:r>
@@ -3044,26 +3050,146 @@
               <a:t>Server: IIS hosted ASP web service</a:t>
             </a:r>
           </a:p>
-          <a:p>
-            <a:r>
-              <a:rPr lang="en-US" dirty="0"/>
-              <a:t>IDE: Visual Studio</a:t>
-            </a:r>
-          </a:p>
-          <a:p>
-            <a:r>
-              <a:rPr lang="en-US" dirty="0"/>
-              <a:t>GUI WPF</a:t>
-            </a:r>
-          </a:p>
-          <a:p>
-            <a:r>
-              <a:rPr lang="en-US" dirty="0"/>
-              <a:t>Target platform: Windows 7+</a:t>
-            </a:r>
-          </a:p>
-        </p:txBody>
-      </p:sp>
+        </p:txBody>
+      </p:sp>
+      <p:pic>
+        <p:nvPicPr>
+          <p:cNvPr id="7" name="Recorded Sound">
+            <a:hlinkClick r:id="" action="ppaction://media"/>
+          </p:cNvPr>
+          <p:cNvPicPr>
+            <a:picLocks noChangeAspect="1"/>
+          </p:cNvPicPr>
+          <p:nvPr>
+            <a:audioFile r:link="rId1"/>
+            <p:extLst>
+              <p:ext uri="{DAA4B4D4-6D71-4841-9C94-3DE7FCFB9230}">
+                <p14:media xmlns:p14="http://schemas.microsoft.com/office/powerpoint/2010/main" r:embed="rId2">
+                  <p14:trim end="0.2018"/>
+                </p14:media>
+              </p:ext>
+            </p:extLst>
+          </p:nvPr>
+        </p:nvPicPr>
+        <p:blipFill>
+          <a:blip r:embed="rId8"/>
+          <a:stretch>
+            <a:fillRect/>
+          </a:stretch>
+        </p:blipFill>
+        <p:spPr>
+          <a:xfrm>
+            <a:off x="5678067" y="6100763"/>
+            <a:ext cx="304800" cy="304800"/>
+          </a:xfrm>
+          <a:prstGeom prst="rect">
+            <a:avLst/>
+          </a:prstGeom>
+        </p:spPr>
+      </p:pic>
+      <p:pic>
+        <p:nvPicPr>
+          <p:cNvPr id="8" name="Recorded Sound">
+            <a:hlinkClick r:id="" action="ppaction://media"/>
+          </p:cNvPr>
+          <p:cNvPicPr>
+            <a:picLocks noChangeAspect="1"/>
+          </p:cNvPicPr>
+          <p:nvPr>
+            <a:audioFile r:link="rId1"/>
+            <p:extLst>
+              <p:ext uri="{DAA4B4D4-6D71-4841-9C94-3DE7FCFB9230}">
+                <p14:media xmlns:p14="http://schemas.microsoft.com/office/powerpoint/2010/main" r:embed="rId3">
+                  <p14:trim end="260.9365"/>
+                </p14:media>
+              </p:ext>
+            </p:extLst>
+          </p:nvPr>
+        </p:nvPicPr>
+        <p:blipFill>
+          <a:blip r:embed="rId8"/>
+          <a:stretch>
+            <a:fillRect/>
+          </a:stretch>
+        </p:blipFill>
+        <p:spPr>
+          <a:xfrm>
+            <a:off x="5196090" y="6122891"/>
+            <a:ext cx="304800" cy="304800"/>
+          </a:xfrm>
+          <a:prstGeom prst="rect">
+            <a:avLst/>
+          </a:prstGeom>
+        </p:spPr>
+      </p:pic>
+      <p:pic>
+        <p:nvPicPr>
+          <p:cNvPr id="9" name="Recorded Sound">
+            <a:hlinkClick r:id="" action="ppaction://media"/>
+          </p:cNvPr>
+          <p:cNvPicPr>
+            <a:picLocks noChangeAspect="1"/>
+          </p:cNvPicPr>
+          <p:nvPr>
+            <a:audioFile r:link="rId1"/>
+            <p:extLst>
+              <p:ext uri="{DAA4B4D4-6D71-4841-9C94-3DE7FCFB9230}">
+                <p14:media xmlns:p14="http://schemas.microsoft.com/office/powerpoint/2010/main" r:embed="rId4">
+                  <p14:trim end="265.9297"/>
+                </p14:media>
+              </p:ext>
+            </p:extLst>
+          </p:nvPr>
+        </p:nvPicPr>
+        <p:blipFill>
+          <a:blip r:embed="rId8"/>
+          <a:stretch>
+            <a:fillRect/>
+          </a:stretch>
+        </p:blipFill>
+        <p:spPr>
+          <a:xfrm>
+            <a:off x="6096000" y="6100763"/>
+            <a:ext cx="304800" cy="304800"/>
+          </a:xfrm>
+          <a:prstGeom prst="rect">
+            <a:avLst/>
+          </a:prstGeom>
+        </p:spPr>
+      </p:pic>
+      <p:pic>
+        <p:nvPicPr>
+          <p:cNvPr id="10" name="Recorded Sound">
+            <a:hlinkClick r:id="" action="ppaction://media"/>
+          </p:cNvPr>
+          <p:cNvPicPr>
+            <a:picLocks noChangeAspect="1"/>
+          </p:cNvPicPr>
+          <p:nvPr>
+            <a:audioFile r:link="rId6"/>
+            <p:extLst>
+              <p:ext uri="{DAA4B4D4-6D71-4841-9C94-3DE7FCFB9230}">
+                <p14:media xmlns:p14="http://schemas.microsoft.com/office/powerpoint/2010/main" r:embed="rId5"/>
+              </p:ext>
+            </p:extLst>
+          </p:nvPr>
+        </p:nvPicPr>
+        <p:blipFill>
+          <a:blip r:embed="rId8"/>
+          <a:stretch>
+            <a:fillRect/>
+          </a:stretch>
+        </p:blipFill>
+        <p:spPr>
+          <a:xfrm>
+            <a:off x="6513933" y="6081129"/>
+            <a:ext cx="304800" cy="304800"/>
+          </a:xfrm>
+          <a:prstGeom prst="rect">
+            <a:avLst/>
+          </a:prstGeom>
+        </p:spPr>
+      </p:pic>
     </p:spTree>
     <p:extLst>
       <p:ext uri="{BB962C8B-B14F-4D97-AF65-F5344CB8AC3E}">
@@ -3074,6 +3200,225 @@
   <p:clrMapOvr>
     <a:masterClrMapping/>
   </p:clrMapOvr>
+  <p:timing>
+    <p:tnLst>
+      <p:par>
+        <p:cTn id="1" dur="indefinite" restart="never" nodeType="tmRoot">
+          <p:childTnLst>
+            <p:seq concurrent="1" nextAc="seek">
+              <p:cTn id="2" dur="indefinite" nodeType="mainSeq">
+                <p:childTnLst>
+                  <p:par>
+                    <p:cTn id="3" fill="hold">
+                      <p:stCondLst>
+                        <p:cond delay="indefinite"/>
+                      </p:stCondLst>
+                      <p:childTnLst>
+                        <p:par>
+                          <p:cTn id="4" fill="hold">
+                            <p:stCondLst>
+                              <p:cond delay="0"/>
+                            </p:stCondLst>
+                            <p:childTnLst>
+                              <p:par>
+                                <p:cTn id="5" presetID="1" presetClass="mediacall" presetSubtype="0" fill="hold" nodeType="clickEffect">
+                                  <p:stCondLst>
+                                    <p:cond delay="0"/>
+                                  </p:stCondLst>
+                                  <p:childTnLst>
+                                    <p:cmd type="call" cmd="playFrom(0.0)">
+                                      <p:cBhvr>
+                                        <p:cTn id="6" dur="10457" fill="hold"/>
+                                        <p:tgtEl>
+                                          <p:spTgt spid="8"/>
+                                        </p:tgtEl>
+                                      </p:cBhvr>
+                                    </p:cmd>
+                                  </p:childTnLst>
+                                </p:cTn>
+                              </p:par>
+                            </p:childTnLst>
+                          </p:cTn>
+                        </p:par>
+                        <p:par>
+                          <p:cTn id="7" fill="hold">
+                            <p:stCondLst>
+                              <p:cond delay="10457"/>
+                            </p:stCondLst>
+                            <p:childTnLst>
+                              <p:par>
+                                <p:cTn id="8" presetID="1" presetClass="mediacall" presetSubtype="0" fill="hold" nodeType="afterEffect">
+                                  <p:stCondLst>
+                                    <p:cond delay="0"/>
+                                  </p:stCondLst>
+                                  <p:childTnLst>
+                                    <p:cmd type="call" cmd="playFrom(0.0)">
+                                      <p:cBhvr>
+                                        <p:cTn id="9" dur="7991" fill="hold"/>
+                                        <p:tgtEl>
+                                          <p:spTgt spid="7"/>
+                                        </p:tgtEl>
+                                      </p:cBhvr>
+                                    </p:cmd>
+                                  </p:childTnLst>
+                                </p:cTn>
+                              </p:par>
+                            </p:childTnLst>
+                          </p:cTn>
+                        </p:par>
+                        <p:par>
+                          <p:cTn id="10" fill="hold">
+                            <p:stCondLst>
+                              <p:cond delay="18448"/>
+                            </p:stCondLst>
+                            <p:childTnLst>
+                              <p:par>
+                                <p:cTn id="11" presetID="1" presetClass="mediacall" presetSubtype="0" fill="hold" nodeType="afterEffect">
+                                  <p:stCondLst>
+                                    <p:cond delay="0"/>
+                                  </p:stCondLst>
+                                  <p:childTnLst>
+                                    <p:cmd type="call" cmd="playFrom(0.0)">
+                                      <p:cBhvr>
+                                        <p:cTn id="12" dur="13935" fill="hold"/>
+                                        <p:tgtEl>
+                                          <p:spTgt spid="9"/>
+                                        </p:tgtEl>
+                                      </p:cBhvr>
+                                    </p:cmd>
+                                  </p:childTnLst>
+                                </p:cTn>
+                              </p:par>
+                            </p:childTnLst>
+                          </p:cTn>
+                        </p:par>
+                        <p:par>
+                          <p:cTn id="13" fill="hold">
+                            <p:stCondLst>
+                              <p:cond delay="32383"/>
+                            </p:stCondLst>
+                            <p:childTnLst>
+                              <p:par>
+                                <p:cTn id="14" presetID="1" presetClass="mediacall" presetSubtype="0" fill="hold" nodeType="afterEffect">
+                                  <p:stCondLst>
+                                    <p:cond delay="0"/>
+                                  </p:stCondLst>
+                                  <p:childTnLst>
+                                    <p:cmd type="call" cmd="playFrom(0.0)">
+                                      <p:cBhvr>
+                                        <p:cTn id="15" dur="9500" fill="hold"/>
+                                        <p:tgtEl>
+                                          <p:spTgt spid="10"/>
+                                        </p:tgtEl>
+                                      </p:cBhvr>
+                                    </p:cmd>
+                                  </p:childTnLst>
+                                </p:cTn>
+                              </p:par>
+                            </p:childTnLst>
+                          </p:cTn>
+                        </p:par>
+                      </p:childTnLst>
+                    </p:cTn>
+                  </p:par>
+                </p:childTnLst>
+              </p:cTn>
+              <p:prevCondLst>
+                <p:cond evt="onPrev" delay="0">
+                  <p:tgtEl>
+                    <p:sldTgt/>
+                  </p:tgtEl>
+                </p:cond>
+              </p:prevCondLst>
+              <p:nextCondLst>
+                <p:cond evt="onNext" delay="0">
+                  <p:tgtEl>
+                    <p:sldTgt/>
+                  </p:tgtEl>
+                </p:cond>
+              </p:nextCondLst>
+            </p:seq>
+            <p:audio>
+              <p:cMediaNode vol="80000">
+                <p:cTn id="16" fill="hold" display="0">
+                  <p:stCondLst>
+                    <p:cond delay="indefinite"/>
+                  </p:stCondLst>
+                  <p:endCondLst>
+                    <p:cond evt="onStopAudio" delay="0">
+                      <p:tgtEl>
+                        <p:sldTgt/>
+                      </p:tgtEl>
+                    </p:cond>
+                  </p:endCondLst>
+                </p:cTn>
+                <p:tgtEl>
+                  <p:spTgt spid="7"/>
+                </p:tgtEl>
+              </p:cMediaNode>
+            </p:audio>
+            <p:audio>
+              <p:cMediaNode vol="80000">
+                <p:cTn id="17" fill="hold" display="0">
+                  <p:stCondLst>
+                    <p:cond delay="indefinite"/>
+                  </p:stCondLst>
+                  <p:endCondLst>
+                    <p:cond evt="onStopAudio" delay="0">
+                      <p:tgtEl>
+                        <p:sldTgt/>
+                      </p:tgtEl>
+                    </p:cond>
+                  </p:endCondLst>
+                </p:cTn>
+                <p:tgtEl>
+                  <p:spTgt spid="8"/>
+                </p:tgtEl>
+              </p:cMediaNode>
+            </p:audio>
+            <p:audio>
+              <p:cMediaNode vol="80000">
+                <p:cTn id="18" fill="hold" display="0">
+                  <p:stCondLst>
+                    <p:cond delay="indefinite"/>
+                  </p:stCondLst>
+                  <p:endCondLst>
+                    <p:cond evt="onStopAudio" delay="0">
+                      <p:tgtEl>
+                        <p:sldTgt/>
+                      </p:tgtEl>
+                    </p:cond>
+                  </p:endCondLst>
+                </p:cTn>
+                <p:tgtEl>
+                  <p:spTgt spid="9"/>
+                </p:tgtEl>
+              </p:cMediaNode>
+            </p:audio>
+            <p:audio>
+              <p:cMediaNode vol="80000">
+                <p:cTn id="19" fill="hold" display="0">
+                  <p:stCondLst>
+                    <p:cond delay="indefinite"/>
+                  </p:stCondLst>
+                  <p:endCondLst>
+                    <p:cond evt="onStopAudio" delay="0">
+                      <p:tgtEl>
+                        <p:sldTgt/>
+                      </p:tgtEl>
+                    </p:cond>
+                  </p:endCondLst>
+                </p:cTn>
+                <p:tgtEl>
+                  <p:spTgt spid="10"/>
+                </p:tgtEl>
+              </p:cMediaNode>
+            </p:audio>
+          </p:childTnLst>
+        </p:cTn>
+      </p:par>
+    </p:tnLst>
+  </p:timing>
 </p:sld>
 </file>
 
@@ -3126,7 +3471,12 @@
             <p:ph idx="1"/>
           </p:nvPr>
         </p:nvSpPr>
-        <p:spPr/>
+        <p:spPr>
+          <a:xfrm>
+            <a:off x="838200" y="1909772"/>
+            <a:ext cx="10515600" cy="4351338"/>
+          </a:xfrm>
+        </p:spPr>
         <p:txBody>
           <a:bodyPr/>
           <a:lstStyle/>
@@ -3135,13 +3485,26 @@
               <a:rPr lang="en-US" dirty="0"/>
               <a:t>Code Structure: MVC</a:t>
             </a:r>
+            <a:endParaRPr lang="en-US" dirty="0"/>
+          </a:p>
+          <a:p>
+            <a:r>
+              <a:rPr lang="en-US" dirty="0"/>
+              <a:t>Single Instance Controller</a:t>
+            </a:r>
+          </a:p>
+          <a:p>
+            <a:r>
+              <a:rPr lang="en-US" dirty="0"/>
+              <a:t>Separate projects for application, server and unit tests</a:t>
+            </a:r>
+            <a:endParaRPr lang="en-US" dirty="0"/>
           </a:p>
           <a:p>
             <a:r>
               <a:rPr lang="en-US" dirty="0"/>
               <a:t>Development Model: Incremental</a:t>
             </a:r>
-            <a:endParaRPr lang="en-US" dirty="0"/>
           </a:p>
           <a:p>
             <a:r>
@@ -3162,24 +3525,108 @@
               <a:rPr lang="en-US" dirty="0"/>
               <a:t>Client: UI interaction</a:t>
             </a:r>
-            <a:endParaRPr lang="en-US" dirty="0"/>
-          </a:p>
-          <a:p>
-            <a:r>
-              <a:rPr lang="en-US" dirty="0"/>
-              <a:t>Single Instance Controller</a:t>
-            </a:r>
-            <a:endParaRPr lang="en-US" dirty="0"/>
-          </a:p>
-          <a:p>
-            <a:r>
-              <a:rPr lang="en-US" dirty="0"/>
-              <a:t>Separate projects for application, server and unit tests</a:t>
-            </a:r>
-            <a:endParaRPr lang="en-US" dirty="0"/>
-          </a:p>
-        </p:txBody>
-      </p:sp>
+          </a:p>
+        </p:txBody>
+      </p:sp>
+      <p:pic>
+        <p:nvPicPr>
+          <p:cNvPr id="4" name="Recorded Sound">
+            <a:hlinkClick r:id="" action="ppaction://media"/>
+          </p:cNvPr>
+          <p:cNvPicPr>
+            <a:picLocks noChangeAspect="1"/>
+          </p:cNvPicPr>
+          <p:nvPr>
+            <a:audioFile r:link="rId2"/>
+            <p:extLst>
+              <p:ext uri="{DAA4B4D4-6D71-4841-9C94-3DE7FCFB9230}">
+                <p14:media xmlns:p14="http://schemas.microsoft.com/office/powerpoint/2010/main" r:embed="rId1"/>
+              </p:ext>
+            </p:extLst>
+          </p:nvPr>
+        </p:nvPicPr>
+        <p:blipFill>
+          <a:blip r:embed="rId8"/>
+          <a:stretch>
+            <a:fillRect/>
+          </a:stretch>
+        </p:blipFill>
+        <p:spPr>
+          <a:xfrm>
+            <a:off x="2476734" y="6175394"/>
+            <a:ext cx="304800" cy="304800"/>
+          </a:xfrm>
+          <a:prstGeom prst="rect">
+            <a:avLst/>
+          </a:prstGeom>
+        </p:spPr>
+      </p:pic>
+      <p:pic>
+        <p:nvPicPr>
+          <p:cNvPr id="5" name="Recorded Sound">
+            <a:hlinkClick r:id="" action="ppaction://media"/>
+          </p:cNvPr>
+          <p:cNvPicPr>
+            <a:picLocks noChangeAspect="1"/>
+          </p:cNvPicPr>
+          <p:nvPr>
+            <a:audioFile r:link="rId4"/>
+            <p:extLst>
+              <p:ext uri="{DAA4B4D4-6D71-4841-9C94-3DE7FCFB9230}">
+                <p14:media xmlns:p14="http://schemas.microsoft.com/office/powerpoint/2010/main" r:embed="rId3"/>
+              </p:ext>
+            </p:extLst>
+          </p:nvPr>
+        </p:nvPicPr>
+        <p:blipFill>
+          <a:blip r:embed="rId8"/>
+          <a:stretch>
+            <a:fillRect/>
+          </a:stretch>
+        </p:blipFill>
+        <p:spPr>
+          <a:xfrm>
+            <a:off x="2970397" y="6175394"/>
+            <a:ext cx="304800" cy="304800"/>
+          </a:xfrm>
+          <a:prstGeom prst="rect">
+            <a:avLst/>
+          </a:prstGeom>
+        </p:spPr>
+      </p:pic>
+      <p:pic>
+        <p:nvPicPr>
+          <p:cNvPr id="6" name="Recorded Sound">
+            <a:hlinkClick r:id="" action="ppaction://media"/>
+          </p:cNvPr>
+          <p:cNvPicPr>
+            <a:picLocks noChangeAspect="1"/>
+          </p:cNvPicPr>
+          <p:nvPr>
+            <a:audioFile r:link="rId6"/>
+            <p:extLst>
+              <p:ext uri="{DAA4B4D4-6D71-4841-9C94-3DE7FCFB9230}">
+                <p14:media xmlns:p14="http://schemas.microsoft.com/office/powerpoint/2010/main" r:embed="rId5"/>
+              </p:ext>
+            </p:extLst>
+          </p:nvPr>
+        </p:nvPicPr>
+        <p:blipFill>
+          <a:blip r:embed="rId8"/>
+          <a:stretch>
+            <a:fillRect/>
+          </a:stretch>
+        </p:blipFill>
+        <p:spPr>
+          <a:xfrm>
+            <a:off x="3484629" y="6108710"/>
+            <a:ext cx="304800" cy="304800"/>
+          </a:xfrm>
+          <a:prstGeom prst="rect">
+            <a:avLst/>
+          </a:prstGeom>
+        </p:spPr>
+      </p:pic>
     </p:spTree>
     <p:extLst>
       <p:ext uri="{BB962C8B-B14F-4D97-AF65-F5344CB8AC3E}">
@@ -3190,6 +3637,180 @@
   <p:clrMapOvr>
     <a:masterClrMapping/>
   </p:clrMapOvr>
+  <p:timing>
+    <p:tnLst>
+      <p:par>
+        <p:cTn id="1" dur="indefinite" restart="never" nodeType="tmRoot">
+          <p:childTnLst>
+            <p:seq concurrent="1" nextAc="seek">
+              <p:cTn id="2" dur="indefinite" nodeType="mainSeq">
+                <p:childTnLst>
+                  <p:par>
+                    <p:cTn id="3" fill="hold">
+                      <p:stCondLst>
+                        <p:cond delay="indefinite"/>
+                      </p:stCondLst>
+                      <p:childTnLst>
+                        <p:par>
+                          <p:cTn id="4" fill="hold">
+                            <p:stCondLst>
+                              <p:cond delay="0"/>
+                            </p:stCondLst>
+                            <p:childTnLst>
+                              <p:par>
+                                <p:cTn id="5" presetID="1" presetClass="mediacall" presetSubtype="0" fill="hold" nodeType="clickEffect">
+                                  <p:stCondLst>
+                                    <p:cond delay="0"/>
+                                  </p:stCondLst>
+                                  <p:childTnLst>
+                                    <p:cmd type="call" cmd="playFrom(0.0)">
+                                      <p:cBhvr>
+                                        <p:cTn id="6" dur="31002" fill="hold"/>
+                                        <p:tgtEl>
+                                          <p:spTgt spid="4"/>
+                                        </p:tgtEl>
+                                      </p:cBhvr>
+                                    </p:cmd>
+                                  </p:childTnLst>
+                                </p:cTn>
+                              </p:par>
+                            </p:childTnLst>
+                          </p:cTn>
+                        </p:par>
+                        <p:par>
+                          <p:cTn id="7" fill="hold">
+                            <p:stCondLst>
+                              <p:cond delay="31002"/>
+                            </p:stCondLst>
+                            <p:childTnLst>
+                              <p:par>
+                                <p:cTn id="8" presetID="1" presetClass="mediacall" presetSubtype="0" fill="hold" nodeType="afterEffect">
+                                  <p:stCondLst>
+                                    <p:cond delay="0"/>
+                                  </p:stCondLst>
+                                  <p:childTnLst>
+                                    <p:cmd type="call" cmd="playFrom(0.0)">
+                                      <p:cBhvr>
+                                        <p:cTn id="9" dur="13285" fill="hold"/>
+                                        <p:tgtEl>
+                                          <p:spTgt spid="5"/>
+                                        </p:tgtEl>
+                                      </p:cBhvr>
+                                    </p:cmd>
+                                  </p:childTnLst>
+                                </p:cTn>
+                              </p:par>
+                            </p:childTnLst>
+                          </p:cTn>
+                        </p:par>
+                        <p:par>
+                          <p:cTn id="10" fill="hold">
+                            <p:stCondLst>
+                              <p:cond delay="44287"/>
+                            </p:stCondLst>
+                            <p:childTnLst>
+                              <p:par>
+                                <p:cTn id="11" presetID="1" presetClass="mediacall" presetSubtype="0" fill="hold" nodeType="afterEffect">
+                                  <p:stCondLst>
+                                    <p:cond delay="0"/>
+                                  </p:stCondLst>
+                                  <p:childTnLst>
+                                    <p:cmd type="call" cmd="playFrom(0.0)">
+                                      <p:cBhvr>
+                                        <p:cTn id="12" dur="48301" fill="hold"/>
+                                        <p:tgtEl>
+                                          <p:spTgt spid="6"/>
+                                        </p:tgtEl>
+                                      </p:cBhvr>
+                                    </p:cmd>
+                                  </p:childTnLst>
+                                </p:cTn>
+                              </p:par>
+                            </p:childTnLst>
+                          </p:cTn>
+                        </p:par>
+                      </p:childTnLst>
+                    </p:cTn>
+                  </p:par>
+                </p:childTnLst>
+              </p:cTn>
+              <p:prevCondLst>
+                <p:cond evt="onPrev" delay="0">
+                  <p:tgtEl>
+                    <p:sldTgt/>
+                  </p:tgtEl>
+                </p:cond>
+              </p:prevCondLst>
+              <p:nextCondLst>
+                <p:cond evt="onNext" delay="0">
+                  <p:tgtEl>
+                    <p:sldTgt/>
+                  </p:tgtEl>
+                </p:cond>
+              </p:nextCondLst>
+            </p:seq>
+            <p:audio>
+              <p:cMediaNode vol="80000">
+                <p:cTn id="13" fill="hold" display="0">
+                  <p:stCondLst>
+                    <p:cond delay="indefinite"/>
+                  </p:stCondLst>
+                  <p:endCondLst>
+                    <p:cond evt="onStopAudio" delay="0">
+                      <p:tgtEl>
+                        <p:sldTgt/>
+                      </p:tgtEl>
+                    </p:cond>
+                  </p:endCondLst>
+                </p:cTn>
+                <p:tgtEl>
+                  <p:spTgt spid="4"/>
+                </p:tgtEl>
+              </p:cMediaNode>
+            </p:audio>
+            <p:audio>
+              <p:cMediaNode vol="80000">
+                <p:cTn id="14" fill="hold" display="0">
+                  <p:stCondLst>
+                    <p:cond delay="indefinite"/>
+                  </p:stCondLst>
+                  <p:endCondLst>
+                    <p:cond evt="onStopAudio" delay="0">
+                      <p:tgtEl>
+                        <p:sldTgt/>
+                      </p:tgtEl>
+                    </p:cond>
+                  </p:endCondLst>
+                </p:cTn>
+                <p:tgtEl>
+                  <p:spTgt spid="5"/>
+                </p:tgtEl>
+              </p:cMediaNode>
+            </p:audio>
+            <p:audio>
+              <p:cMediaNode vol="80000">
+                <p:cTn id="15" fill="hold" display="0">
+                  <p:stCondLst>
+                    <p:cond delay="indefinite"/>
+                  </p:stCondLst>
+                  <p:endCondLst>
+                    <p:cond evt="onStopAudio" delay="0">
+                      <p:tgtEl>
+                        <p:sldTgt/>
+                      </p:tgtEl>
+                    </p:cond>
+                  </p:endCondLst>
+                </p:cTn>
+                <p:tgtEl>
+                  <p:spTgt spid="6"/>
+                </p:tgtEl>
+              </p:cMediaNode>
+            </p:audio>
+          </p:childTnLst>
+        </p:cTn>
+      </p:par>
+    </p:tnLst>
+  </p:timing>
 </p:sld>
 </file>
 
@@ -3271,7 +3892,6 @@
               <a:rPr lang="en-US" dirty="0"/>
               <a:t>Detailed database controller</a:t>
             </a:r>
-            <a:endParaRPr lang="en-US" dirty="0"/>
           </a:p>
           <a:p>
             <a:r>
@@ -3282,7 +3902,7 @@
           <a:p>
             <a:r>
               <a:rPr lang="en-US" dirty="0"/>
-              <a:t>Plans and documents to migrate from iteration 2 to 4</a:t>
+              <a:t>Plans and documents to create a road map from iteration 2 to 4</a:t>
             </a:r>
           </a:p>
           <a:p>
@@ -3307,6 +3927,72 @@
           </a:p>
         </p:txBody>
       </p:sp>
+      <p:pic>
+        <p:nvPicPr>
+          <p:cNvPr id="4" name="Recorded Sound">
+            <a:hlinkClick r:id="" action="ppaction://media"/>
+          </p:cNvPr>
+          <p:cNvPicPr>
+            <a:picLocks noChangeAspect="1"/>
+          </p:cNvPicPr>
+          <p:nvPr>
+            <a:audioFile r:link="rId2"/>
+            <p:extLst>
+              <p:ext uri="{DAA4B4D4-6D71-4841-9C94-3DE7FCFB9230}">
+                <p14:media xmlns:p14="http://schemas.microsoft.com/office/powerpoint/2010/main" r:embed="rId1"/>
+              </p:ext>
+            </p:extLst>
+          </p:nvPr>
+        </p:nvPicPr>
+        <p:blipFill>
+          <a:blip r:embed="rId6"/>
+          <a:stretch>
+            <a:fillRect/>
+          </a:stretch>
+        </p:blipFill>
+        <p:spPr>
+          <a:xfrm>
+            <a:off x="1926972" y="6311900"/>
+            <a:ext cx="304800" cy="304800"/>
+          </a:xfrm>
+          <a:prstGeom prst="rect">
+            <a:avLst/>
+          </a:prstGeom>
+        </p:spPr>
+      </p:pic>
+      <p:pic>
+        <p:nvPicPr>
+          <p:cNvPr id="5" name="Recorded Sound">
+            <a:hlinkClick r:id="" action="ppaction://media"/>
+          </p:cNvPr>
+          <p:cNvPicPr>
+            <a:picLocks noChangeAspect="1"/>
+          </p:cNvPicPr>
+          <p:nvPr>
+            <a:audioFile r:link="rId4"/>
+            <p:extLst>
+              <p:ext uri="{DAA4B4D4-6D71-4841-9C94-3DE7FCFB9230}">
+                <p14:media xmlns:p14="http://schemas.microsoft.com/office/powerpoint/2010/main" r:embed="rId3"/>
+              </p:ext>
+            </p:extLst>
+          </p:nvPr>
+        </p:nvPicPr>
+        <p:blipFill>
+          <a:blip r:embed="rId6"/>
+          <a:stretch>
+            <a:fillRect/>
+          </a:stretch>
+        </p:blipFill>
+        <p:spPr>
+          <a:xfrm>
+            <a:off x="2633808" y="6311900"/>
+            <a:ext cx="304800" cy="304800"/>
+          </a:xfrm>
+          <a:prstGeom prst="rect">
+            <a:avLst/>
+          </a:prstGeom>
+        </p:spPr>
+      </p:pic>
     </p:spTree>
     <p:extLst>
       <p:ext uri="{BB962C8B-B14F-4D97-AF65-F5344CB8AC3E}">
@@ -3317,6 +4003,135 @@
   <p:clrMapOvr>
     <a:masterClrMapping/>
   </p:clrMapOvr>
+  <p:timing>
+    <p:tnLst>
+      <p:par>
+        <p:cTn id="1" dur="indefinite" restart="never" nodeType="tmRoot">
+          <p:childTnLst>
+            <p:seq concurrent="1" nextAc="seek">
+              <p:cTn id="2" dur="indefinite" nodeType="mainSeq">
+                <p:childTnLst>
+                  <p:par>
+                    <p:cTn id="3" fill="hold">
+                      <p:stCondLst>
+                        <p:cond delay="indefinite"/>
+                      </p:stCondLst>
+                      <p:childTnLst>
+                        <p:par>
+                          <p:cTn id="4" fill="hold">
+                            <p:stCondLst>
+                              <p:cond delay="0"/>
+                            </p:stCondLst>
+                            <p:childTnLst>
+                              <p:par>
+                                <p:cTn id="5" presetID="1" presetClass="mediacall" presetSubtype="0" fill="hold" nodeType="clickEffect">
+                                  <p:stCondLst>
+                                    <p:cond delay="0"/>
+                                  </p:stCondLst>
+                                  <p:childTnLst>
+                                    <p:cmd type="call" cmd="playFrom(0.0)">
+                                      <p:cBhvr>
+                                        <p:cTn id="6" dur="25777" fill="hold"/>
+                                        <p:tgtEl>
+                                          <p:spTgt spid="4"/>
+                                        </p:tgtEl>
+                                      </p:cBhvr>
+                                    </p:cmd>
+                                  </p:childTnLst>
+                                </p:cTn>
+                              </p:par>
+                            </p:childTnLst>
+                          </p:cTn>
+                        </p:par>
+                        <p:par>
+                          <p:cTn id="7" fill="hold">
+                            <p:stCondLst>
+                              <p:cond delay="25777"/>
+                            </p:stCondLst>
+                            <p:childTnLst>
+                              <p:par>
+                                <p:cTn id="8" presetID="1" presetClass="mediacall" presetSubtype="0" fill="hold" nodeType="afterEffect">
+                                  <p:stCondLst>
+                                    <p:cond delay="0"/>
+                                  </p:stCondLst>
+                                  <p:childTnLst>
+                                    <p:cmd type="call" cmd="playFrom(0.0)">
+                                      <p:cBhvr>
+                                        <p:cTn id="9" dur="26404" fill="hold"/>
+                                        <p:tgtEl>
+                                          <p:spTgt spid="5"/>
+                                        </p:tgtEl>
+                                      </p:cBhvr>
+                                    </p:cmd>
+                                  </p:childTnLst>
+                                </p:cTn>
+                              </p:par>
+                            </p:childTnLst>
+                          </p:cTn>
+                        </p:par>
+                      </p:childTnLst>
+                    </p:cTn>
+                  </p:par>
+                </p:childTnLst>
+              </p:cTn>
+              <p:prevCondLst>
+                <p:cond evt="onPrev" delay="0">
+                  <p:tgtEl>
+                    <p:sldTgt/>
+                  </p:tgtEl>
+                </p:cond>
+              </p:prevCondLst>
+              <p:nextCondLst>
+                <p:cond evt="onNext" delay="0">
+                  <p:tgtEl>
+                    <p:sldTgt/>
+                  </p:tgtEl>
+                </p:cond>
+              </p:nextCondLst>
+            </p:seq>
+            <p:audio>
+              <p:cMediaNode vol="80000">
+                <p:cTn id="10" fill="hold" display="0">
+                  <p:stCondLst>
+                    <p:cond delay="indefinite"/>
+                  </p:stCondLst>
+                  <p:endCondLst>
+                    <p:cond evt="onStopAudio" delay="0">
+                      <p:tgtEl>
+                        <p:sldTgt/>
+                      </p:tgtEl>
+                    </p:cond>
+                  </p:endCondLst>
+                </p:cTn>
+                <p:tgtEl>
+                  <p:spTgt spid="4"/>
+                </p:tgtEl>
+              </p:cMediaNode>
+            </p:audio>
+            <p:audio>
+              <p:cMediaNode vol="80000">
+                <p:cTn id="11" fill="hold" display="0">
+                  <p:stCondLst>
+                    <p:cond delay="indefinite"/>
+                  </p:stCondLst>
+                  <p:endCondLst>
+                    <p:cond evt="onStopAudio" delay="0">
+                      <p:tgtEl>
+                        <p:sldTgt/>
+                      </p:tgtEl>
+                    </p:cond>
+                  </p:endCondLst>
+                </p:cTn>
+                <p:tgtEl>
+                  <p:spTgt spid="5"/>
+                </p:tgtEl>
+              </p:cMediaNode>
+            </p:audio>
+          </p:childTnLst>
+        </p:cTn>
+      </p:par>
+    </p:tnLst>
+  </p:timing>
 </p:sld>
 </file>
 

</xml_diff>